<commit_message>
updated plots and draft in near final form
</commit_message>
<xml_diff>
--- a/local/plots/quasar_mode_feedback.pptx
+++ b/local/plots/quasar_mode_feedback.pptx
@@ -2,12 +2,12 @@
 <file path=ppt/presentation.xml><?xml version="1.0" encoding="utf-8"?>
 <p:presentation xmlns:a="http://schemas.openxmlformats.org/drawingml/2006/main" xmlns:r="http://schemas.openxmlformats.org/officeDocument/2006/relationships" xmlns:p="http://schemas.openxmlformats.org/presentationml/2006/main" saveSubsetFonts="1" autoCompressPictures="0">
   <p:sldMasterIdLst>
-    <p:sldMasterId id="2147483684" r:id="rId1"/>
+    <p:sldMasterId id="2147483708" r:id="rId1"/>
   </p:sldMasterIdLst>
   <p:sldIdLst>
     <p:sldId id="256" r:id="rId2"/>
   </p:sldIdLst>
-  <p:sldSz cx="11879263" cy="4338638"/>
+  <p:sldSz cx="11879263" cy="3960813"/>
   <p:notesSz cx="6858000" cy="9144000"/>
   <p:defaultTextStyle>
     <a:defPPr>
@@ -141,15 +141,15 @@
         </p:nvSpPr>
         <p:spPr>
           <a:xfrm>
-            <a:off x="1484908" y="710050"/>
-            <a:ext cx="8909447" cy="1510489"/>
+            <a:off x="1484908" y="648217"/>
+            <a:ext cx="8909447" cy="1378950"/>
           </a:xfrm>
         </p:spPr>
         <p:txBody>
           <a:bodyPr anchor="b"/>
           <a:lstStyle>
             <a:lvl1pPr algn="ctr">
-              <a:defRPr sz="3796"/>
+              <a:defRPr sz="3465"/>
             </a:lvl1pPr>
           </a:lstStyle>
           <a:p>
@@ -173,8 +173,8 @@
         </p:nvSpPr>
         <p:spPr>
           <a:xfrm>
-            <a:off x="1484908" y="2278789"/>
-            <a:ext cx="8909447" cy="1047500"/>
+            <a:off x="1484908" y="2080344"/>
+            <a:ext cx="8909447" cy="956279"/>
           </a:xfrm>
         </p:spPr>
         <p:txBody>
@@ -182,39 +182,39 @@
           <a:lstStyle>
             <a:lvl1pPr marL="0" indent="0" algn="ctr">
               <a:buNone/>
-              <a:defRPr sz="1518"/>
+              <a:defRPr sz="1386"/>
             </a:lvl1pPr>
-            <a:lvl2pPr marL="289225" indent="0" algn="ctr">
+            <a:lvl2pPr marL="264033" indent="0" algn="ctr">
               <a:buNone/>
-              <a:defRPr sz="1265"/>
+              <a:defRPr sz="1155"/>
             </a:lvl2pPr>
-            <a:lvl3pPr marL="578449" indent="0" algn="ctr">
+            <a:lvl3pPr marL="528066" indent="0" algn="ctr">
               <a:buNone/>
-              <a:defRPr sz="1139"/>
+              <a:defRPr sz="1040"/>
             </a:lvl3pPr>
-            <a:lvl4pPr marL="867674" indent="0" algn="ctr">
+            <a:lvl4pPr marL="792099" indent="0" algn="ctr">
               <a:buNone/>
-              <a:defRPr sz="1012"/>
+              <a:defRPr sz="924"/>
             </a:lvl4pPr>
-            <a:lvl5pPr marL="1156899" indent="0" algn="ctr">
+            <a:lvl5pPr marL="1056132" indent="0" algn="ctr">
               <a:buNone/>
-              <a:defRPr sz="1012"/>
+              <a:defRPr sz="924"/>
             </a:lvl5pPr>
-            <a:lvl6pPr marL="1446124" indent="0" algn="ctr">
+            <a:lvl6pPr marL="1320165" indent="0" algn="ctr">
               <a:buNone/>
-              <a:defRPr sz="1012"/>
+              <a:defRPr sz="924"/>
             </a:lvl6pPr>
-            <a:lvl7pPr marL="1735348" indent="0" algn="ctr">
+            <a:lvl7pPr marL="1584198" indent="0" algn="ctr">
               <a:buNone/>
-              <a:defRPr sz="1012"/>
+              <a:defRPr sz="924"/>
             </a:lvl7pPr>
-            <a:lvl8pPr marL="2024573" indent="0" algn="ctr">
+            <a:lvl8pPr marL="1848231" indent="0" algn="ctr">
               <a:buNone/>
-              <a:defRPr sz="1012"/>
+              <a:defRPr sz="924"/>
             </a:lvl8pPr>
-            <a:lvl9pPr marL="2313798" indent="0" algn="ctr">
+            <a:lvl9pPr marL="2112264" indent="0" algn="ctr">
               <a:buNone/>
-              <a:defRPr sz="1012"/>
+              <a:defRPr sz="924"/>
             </a:lvl9pPr>
           </a:lstStyle>
           <a:p>
@@ -243,7 +243,7 @@
           <a:p>
             <a:fld id="{2DAC84F6-6BCF-0648-8D07-FD4F918A8B04}" type="datetimeFigureOut">
               <a:rPr lang="en-GB" smtClean="0"/>
-              <a:t>29/10/2019</a:t>
+              <a:t>03/11/2019</a:t>
             </a:fld>
             <a:endParaRPr lang="en-GB"/>
           </a:p>
@@ -408,7 +408,7 @@
           <a:p>
             <a:fld id="{2DAC84F6-6BCF-0648-8D07-FD4F918A8B04}" type="datetimeFigureOut">
               <a:rPr lang="en-GB" smtClean="0"/>
-              <a:t>29/10/2019</a:t>
+              <a:t>03/11/2019</a:t>
             </a:fld>
             <a:endParaRPr lang="en-GB"/>
           </a:p>
@@ -493,8 +493,8 @@
         </p:nvSpPr>
         <p:spPr>
           <a:xfrm>
-            <a:off x="8501098" y="230992"/>
-            <a:ext cx="2561466" cy="3676795"/>
+            <a:off x="8501098" y="210877"/>
+            <a:ext cx="2561466" cy="3356606"/>
           </a:xfrm>
         </p:spPr>
         <p:txBody>
@@ -521,8 +521,8 @@
         </p:nvSpPr>
         <p:spPr>
           <a:xfrm>
-            <a:off x="816700" y="230992"/>
-            <a:ext cx="7535907" cy="3676795"/>
+            <a:off x="816700" y="210877"/>
+            <a:ext cx="7535907" cy="3356606"/>
           </a:xfrm>
         </p:spPr>
         <p:txBody>
@@ -583,7 +583,7 @@
           <a:p>
             <a:fld id="{2DAC84F6-6BCF-0648-8D07-FD4F918A8B04}" type="datetimeFigureOut">
               <a:rPr lang="en-GB" smtClean="0"/>
-              <a:t>29/10/2019</a:t>
+              <a:t>03/11/2019</a:t>
             </a:fld>
             <a:endParaRPr lang="en-GB"/>
           </a:p>
@@ -748,7 +748,7 @@
           <a:p>
             <a:fld id="{2DAC84F6-6BCF-0648-8D07-FD4F918A8B04}" type="datetimeFigureOut">
               <a:rPr lang="en-GB" smtClean="0"/>
-              <a:t>29/10/2019</a:t>
+              <a:t>03/11/2019</a:t>
             </a:fld>
             <a:endParaRPr lang="en-GB"/>
           </a:p>
@@ -833,15 +833,15 @@
         </p:nvSpPr>
         <p:spPr>
           <a:xfrm>
-            <a:off x="810512" y="1081647"/>
-            <a:ext cx="10245864" cy="1804753"/>
+            <a:off x="810512" y="987453"/>
+            <a:ext cx="10245864" cy="1647588"/>
           </a:xfrm>
         </p:spPr>
         <p:txBody>
           <a:bodyPr anchor="b"/>
           <a:lstStyle>
             <a:lvl1pPr>
-              <a:defRPr sz="3796"/>
+              <a:defRPr sz="3465"/>
             </a:lvl1pPr>
           </a:lstStyle>
           <a:p>
@@ -865,8 +865,8 @@
         </p:nvSpPr>
         <p:spPr>
           <a:xfrm>
-            <a:off x="810512" y="2903473"/>
-            <a:ext cx="10245864" cy="949077"/>
+            <a:off x="810512" y="2650628"/>
+            <a:ext cx="10245864" cy="866428"/>
           </a:xfrm>
         </p:spPr>
         <p:txBody>
@@ -874,7 +874,7 @@
           <a:lstStyle>
             <a:lvl1pPr marL="0" indent="0">
               <a:buNone/>
-              <a:defRPr sz="1518">
+              <a:defRPr sz="1386">
                 <a:solidFill>
                   <a:schemeClr val="tx1">
                     <a:tint val="75000"/>
@@ -882,9 +882,9 @@
                 </a:solidFill>
               </a:defRPr>
             </a:lvl1pPr>
-            <a:lvl2pPr marL="289225" indent="0">
+            <a:lvl2pPr marL="264033" indent="0">
               <a:buNone/>
-              <a:defRPr sz="1265">
+              <a:defRPr sz="1155">
                 <a:solidFill>
                   <a:schemeClr val="tx1">
                     <a:tint val="75000"/>
@@ -892,9 +892,9 @@
                 </a:solidFill>
               </a:defRPr>
             </a:lvl2pPr>
-            <a:lvl3pPr marL="578449" indent="0">
+            <a:lvl3pPr marL="528066" indent="0">
               <a:buNone/>
-              <a:defRPr sz="1139">
+              <a:defRPr sz="1040">
                 <a:solidFill>
                   <a:schemeClr val="tx1">
                     <a:tint val="75000"/>
@@ -902,9 +902,9 @@
                 </a:solidFill>
               </a:defRPr>
             </a:lvl3pPr>
-            <a:lvl4pPr marL="867674" indent="0">
+            <a:lvl4pPr marL="792099" indent="0">
               <a:buNone/>
-              <a:defRPr sz="1012">
+              <a:defRPr sz="924">
                 <a:solidFill>
                   <a:schemeClr val="tx1">
                     <a:tint val="75000"/>
@@ -912,9 +912,9 @@
                 </a:solidFill>
               </a:defRPr>
             </a:lvl4pPr>
-            <a:lvl5pPr marL="1156899" indent="0">
+            <a:lvl5pPr marL="1056132" indent="0">
               <a:buNone/>
-              <a:defRPr sz="1012">
+              <a:defRPr sz="924">
                 <a:solidFill>
                   <a:schemeClr val="tx1">
                     <a:tint val="75000"/>
@@ -922,9 +922,9 @@
                 </a:solidFill>
               </a:defRPr>
             </a:lvl5pPr>
-            <a:lvl6pPr marL="1446124" indent="0">
+            <a:lvl6pPr marL="1320165" indent="0">
               <a:buNone/>
-              <a:defRPr sz="1012">
+              <a:defRPr sz="924">
                 <a:solidFill>
                   <a:schemeClr val="tx1">
                     <a:tint val="75000"/>
@@ -932,9 +932,9 @@
                 </a:solidFill>
               </a:defRPr>
             </a:lvl6pPr>
-            <a:lvl7pPr marL="1735348" indent="0">
+            <a:lvl7pPr marL="1584198" indent="0">
               <a:buNone/>
-              <a:defRPr sz="1012">
+              <a:defRPr sz="924">
                 <a:solidFill>
                   <a:schemeClr val="tx1">
                     <a:tint val="75000"/>
@@ -942,9 +942,9 @@
                 </a:solidFill>
               </a:defRPr>
             </a:lvl7pPr>
-            <a:lvl8pPr marL="2024573" indent="0">
+            <a:lvl8pPr marL="1848231" indent="0">
               <a:buNone/>
-              <a:defRPr sz="1012">
+              <a:defRPr sz="924">
                 <a:solidFill>
                   <a:schemeClr val="tx1">
                     <a:tint val="75000"/>
@@ -952,9 +952,9 @@
                 </a:solidFill>
               </a:defRPr>
             </a:lvl8pPr>
-            <a:lvl9pPr marL="2313798" indent="0">
+            <a:lvl9pPr marL="2112264" indent="0">
               <a:buNone/>
-              <a:defRPr sz="1012">
+              <a:defRPr sz="924">
                 <a:solidFill>
                   <a:schemeClr val="tx1">
                     <a:tint val="75000"/>
@@ -989,7 +989,7 @@
           <a:p>
             <a:fld id="{2DAC84F6-6BCF-0648-8D07-FD4F918A8B04}" type="datetimeFigureOut">
               <a:rPr lang="en-GB" smtClean="0"/>
-              <a:t>29/10/2019</a:t>
+              <a:t>03/11/2019</a:t>
             </a:fld>
             <a:endParaRPr lang="en-GB"/>
           </a:p>
@@ -1097,8 +1097,8 @@
         </p:nvSpPr>
         <p:spPr>
           <a:xfrm>
-            <a:off x="816699" y="1154961"/>
-            <a:ext cx="5048687" cy="2752826"/>
+            <a:off x="816699" y="1054383"/>
+            <a:ext cx="5048687" cy="2513099"/>
           </a:xfrm>
         </p:spPr>
         <p:txBody>
@@ -1154,8 +1154,8 @@
         </p:nvSpPr>
         <p:spPr>
           <a:xfrm>
-            <a:off x="6013877" y="1154961"/>
-            <a:ext cx="5048687" cy="2752826"/>
+            <a:off x="6013877" y="1054383"/>
+            <a:ext cx="5048687" cy="2513099"/>
           </a:xfrm>
         </p:spPr>
         <p:txBody>
@@ -1216,7 +1216,7 @@
           <a:p>
             <a:fld id="{2DAC84F6-6BCF-0648-8D07-FD4F918A8B04}" type="datetimeFigureOut">
               <a:rPr lang="en-GB" smtClean="0"/>
-              <a:t>29/10/2019</a:t>
+              <a:t>03/11/2019</a:t>
             </a:fld>
             <a:endParaRPr lang="en-GB"/>
           </a:p>
@@ -1301,8 +1301,8 @@
         </p:nvSpPr>
         <p:spPr>
           <a:xfrm>
-            <a:off x="818247" y="230993"/>
-            <a:ext cx="10245864" cy="838603"/>
+            <a:off x="818247" y="210877"/>
+            <a:ext cx="10245864" cy="765574"/>
           </a:xfrm>
         </p:spPr>
         <p:txBody>
@@ -1329,8 +1329,8 @@
         </p:nvSpPr>
         <p:spPr>
           <a:xfrm>
-            <a:off x="818247" y="1063569"/>
-            <a:ext cx="5025485" cy="521239"/>
+            <a:off x="818247" y="970950"/>
+            <a:ext cx="5025485" cy="475847"/>
           </a:xfrm>
         </p:spPr>
         <p:txBody>
@@ -1338,39 +1338,39 @@
           <a:lstStyle>
             <a:lvl1pPr marL="0" indent="0">
               <a:buNone/>
-              <a:defRPr sz="1518" b="1"/>
+              <a:defRPr sz="1386" b="1"/>
             </a:lvl1pPr>
-            <a:lvl2pPr marL="289225" indent="0">
+            <a:lvl2pPr marL="264033" indent="0">
               <a:buNone/>
-              <a:defRPr sz="1265" b="1"/>
+              <a:defRPr sz="1155" b="1"/>
             </a:lvl2pPr>
-            <a:lvl3pPr marL="578449" indent="0">
+            <a:lvl3pPr marL="528066" indent="0">
               <a:buNone/>
-              <a:defRPr sz="1139" b="1"/>
+              <a:defRPr sz="1040" b="1"/>
             </a:lvl3pPr>
-            <a:lvl4pPr marL="867674" indent="0">
+            <a:lvl4pPr marL="792099" indent="0">
               <a:buNone/>
-              <a:defRPr sz="1012" b="1"/>
+              <a:defRPr sz="924" b="1"/>
             </a:lvl4pPr>
-            <a:lvl5pPr marL="1156899" indent="0">
+            <a:lvl5pPr marL="1056132" indent="0">
               <a:buNone/>
-              <a:defRPr sz="1012" b="1"/>
+              <a:defRPr sz="924" b="1"/>
             </a:lvl5pPr>
-            <a:lvl6pPr marL="1446124" indent="0">
+            <a:lvl6pPr marL="1320165" indent="0">
               <a:buNone/>
-              <a:defRPr sz="1012" b="1"/>
+              <a:defRPr sz="924" b="1"/>
             </a:lvl6pPr>
-            <a:lvl7pPr marL="1735348" indent="0">
+            <a:lvl7pPr marL="1584198" indent="0">
               <a:buNone/>
-              <a:defRPr sz="1012" b="1"/>
+              <a:defRPr sz="924" b="1"/>
             </a:lvl7pPr>
-            <a:lvl8pPr marL="2024573" indent="0">
+            <a:lvl8pPr marL="1848231" indent="0">
               <a:buNone/>
-              <a:defRPr sz="1012" b="1"/>
+              <a:defRPr sz="924" b="1"/>
             </a:lvl8pPr>
-            <a:lvl9pPr marL="2313798" indent="0">
+            <a:lvl9pPr marL="2112264" indent="0">
               <a:buNone/>
-              <a:defRPr sz="1012" b="1"/>
+              <a:defRPr sz="924" b="1"/>
             </a:lvl9pPr>
           </a:lstStyle>
           <a:p>
@@ -1394,8 +1394,8 @@
         </p:nvSpPr>
         <p:spPr>
           <a:xfrm>
-            <a:off x="818247" y="1584808"/>
-            <a:ext cx="5025485" cy="2331014"/>
+            <a:off x="818247" y="1446797"/>
+            <a:ext cx="5025485" cy="2128020"/>
           </a:xfrm>
         </p:spPr>
         <p:txBody>
@@ -1451,8 +1451,8 @@
         </p:nvSpPr>
         <p:spPr>
           <a:xfrm>
-            <a:off x="6013877" y="1063569"/>
-            <a:ext cx="5050234" cy="521239"/>
+            <a:off x="6013877" y="970950"/>
+            <a:ext cx="5050234" cy="475847"/>
           </a:xfrm>
         </p:spPr>
         <p:txBody>
@@ -1460,39 +1460,39 @@
           <a:lstStyle>
             <a:lvl1pPr marL="0" indent="0">
               <a:buNone/>
-              <a:defRPr sz="1518" b="1"/>
+              <a:defRPr sz="1386" b="1"/>
             </a:lvl1pPr>
-            <a:lvl2pPr marL="289225" indent="0">
+            <a:lvl2pPr marL="264033" indent="0">
               <a:buNone/>
-              <a:defRPr sz="1265" b="1"/>
+              <a:defRPr sz="1155" b="1"/>
             </a:lvl2pPr>
-            <a:lvl3pPr marL="578449" indent="0">
+            <a:lvl3pPr marL="528066" indent="0">
               <a:buNone/>
-              <a:defRPr sz="1139" b="1"/>
+              <a:defRPr sz="1040" b="1"/>
             </a:lvl3pPr>
-            <a:lvl4pPr marL="867674" indent="0">
+            <a:lvl4pPr marL="792099" indent="0">
               <a:buNone/>
-              <a:defRPr sz="1012" b="1"/>
+              <a:defRPr sz="924" b="1"/>
             </a:lvl4pPr>
-            <a:lvl5pPr marL="1156899" indent="0">
+            <a:lvl5pPr marL="1056132" indent="0">
               <a:buNone/>
-              <a:defRPr sz="1012" b="1"/>
+              <a:defRPr sz="924" b="1"/>
             </a:lvl5pPr>
-            <a:lvl6pPr marL="1446124" indent="0">
+            <a:lvl6pPr marL="1320165" indent="0">
               <a:buNone/>
-              <a:defRPr sz="1012" b="1"/>
+              <a:defRPr sz="924" b="1"/>
             </a:lvl6pPr>
-            <a:lvl7pPr marL="1735348" indent="0">
+            <a:lvl7pPr marL="1584198" indent="0">
               <a:buNone/>
-              <a:defRPr sz="1012" b="1"/>
+              <a:defRPr sz="924" b="1"/>
             </a:lvl7pPr>
-            <a:lvl8pPr marL="2024573" indent="0">
+            <a:lvl8pPr marL="1848231" indent="0">
               <a:buNone/>
-              <a:defRPr sz="1012" b="1"/>
+              <a:defRPr sz="924" b="1"/>
             </a:lvl8pPr>
-            <a:lvl9pPr marL="2313798" indent="0">
+            <a:lvl9pPr marL="2112264" indent="0">
               <a:buNone/>
-              <a:defRPr sz="1012" b="1"/>
+              <a:defRPr sz="924" b="1"/>
             </a:lvl9pPr>
           </a:lstStyle>
           <a:p>
@@ -1516,8 +1516,8 @@
         </p:nvSpPr>
         <p:spPr>
           <a:xfrm>
-            <a:off x="6013877" y="1584808"/>
-            <a:ext cx="5050234" cy="2331014"/>
+            <a:off x="6013877" y="1446797"/>
+            <a:ext cx="5050234" cy="2128020"/>
           </a:xfrm>
         </p:spPr>
         <p:txBody>
@@ -1578,7 +1578,7 @@
           <a:p>
             <a:fld id="{2DAC84F6-6BCF-0648-8D07-FD4F918A8B04}" type="datetimeFigureOut">
               <a:rPr lang="en-GB" smtClean="0"/>
-              <a:t>29/10/2019</a:t>
+              <a:t>03/11/2019</a:t>
             </a:fld>
             <a:endParaRPr lang="en-GB"/>
           </a:p>
@@ -1691,7 +1691,7 @@
           <a:p>
             <a:fld id="{2DAC84F6-6BCF-0648-8D07-FD4F918A8B04}" type="datetimeFigureOut">
               <a:rPr lang="en-GB" smtClean="0"/>
-              <a:t>29/10/2019</a:t>
+              <a:t>03/11/2019</a:t>
             </a:fld>
             <a:endParaRPr lang="en-GB"/>
           </a:p>
@@ -1781,7 +1781,7 @@
           <a:p>
             <a:fld id="{2DAC84F6-6BCF-0648-8D07-FD4F918A8B04}" type="datetimeFigureOut">
               <a:rPr lang="en-GB" smtClean="0"/>
-              <a:t>29/10/2019</a:t>
+              <a:t>03/11/2019</a:t>
             </a:fld>
             <a:endParaRPr lang="en-GB"/>
           </a:p>
@@ -1866,15 +1866,15 @@
         </p:nvSpPr>
         <p:spPr>
           <a:xfrm>
-            <a:off x="818247" y="289242"/>
-            <a:ext cx="3831371" cy="1012349"/>
+            <a:off x="818247" y="264054"/>
+            <a:ext cx="3831371" cy="924190"/>
           </a:xfrm>
         </p:spPr>
         <p:txBody>
           <a:bodyPr anchor="b"/>
           <a:lstStyle>
             <a:lvl1pPr>
-              <a:defRPr sz="2024"/>
+              <a:defRPr sz="1848"/>
             </a:lvl1pPr>
           </a:lstStyle>
           <a:p>
@@ -1898,39 +1898,39 @@
         </p:nvSpPr>
         <p:spPr>
           <a:xfrm>
-            <a:off x="5050234" y="624684"/>
-            <a:ext cx="6013877" cy="3083245"/>
+            <a:off x="5050234" y="570284"/>
+            <a:ext cx="6013877" cy="2814744"/>
           </a:xfrm>
         </p:spPr>
         <p:txBody>
           <a:bodyPr/>
           <a:lstStyle>
             <a:lvl1pPr>
-              <a:defRPr sz="2024"/>
+              <a:defRPr sz="1848"/>
             </a:lvl1pPr>
             <a:lvl2pPr>
-              <a:defRPr sz="1771"/>
+              <a:defRPr sz="1617"/>
             </a:lvl2pPr>
             <a:lvl3pPr>
-              <a:defRPr sz="1518"/>
+              <a:defRPr sz="1386"/>
             </a:lvl3pPr>
             <a:lvl4pPr>
-              <a:defRPr sz="1265"/>
+              <a:defRPr sz="1155"/>
             </a:lvl4pPr>
             <a:lvl5pPr>
-              <a:defRPr sz="1265"/>
+              <a:defRPr sz="1155"/>
             </a:lvl5pPr>
             <a:lvl6pPr>
-              <a:defRPr sz="1265"/>
+              <a:defRPr sz="1155"/>
             </a:lvl6pPr>
             <a:lvl7pPr>
-              <a:defRPr sz="1265"/>
+              <a:defRPr sz="1155"/>
             </a:lvl7pPr>
             <a:lvl8pPr>
-              <a:defRPr sz="1265"/>
+              <a:defRPr sz="1155"/>
             </a:lvl8pPr>
             <a:lvl9pPr>
-              <a:defRPr sz="1265"/>
+              <a:defRPr sz="1155"/>
             </a:lvl9pPr>
           </a:lstStyle>
           <a:p>
@@ -1983,8 +1983,8 @@
         </p:nvSpPr>
         <p:spPr>
           <a:xfrm>
-            <a:off x="818247" y="1301591"/>
-            <a:ext cx="3831371" cy="2411359"/>
+            <a:off x="818247" y="1188244"/>
+            <a:ext cx="3831371" cy="2201369"/>
           </a:xfrm>
         </p:spPr>
         <p:txBody>
@@ -1992,39 +1992,39 @@
           <a:lstStyle>
             <a:lvl1pPr marL="0" indent="0">
               <a:buNone/>
-              <a:defRPr sz="1012"/>
+              <a:defRPr sz="924"/>
             </a:lvl1pPr>
-            <a:lvl2pPr marL="289225" indent="0">
+            <a:lvl2pPr marL="264033" indent="0">
               <a:buNone/>
-              <a:defRPr sz="886"/>
+              <a:defRPr sz="809"/>
             </a:lvl2pPr>
-            <a:lvl3pPr marL="578449" indent="0">
+            <a:lvl3pPr marL="528066" indent="0">
               <a:buNone/>
-              <a:defRPr sz="759"/>
+              <a:defRPr sz="693"/>
             </a:lvl3pPr>
-            <a:lvl4pPr marL="867674" indent="0">
+            <a:lvl4pPr marL="792099" indent="0">
               <a:buNone/>
-              <a:defRPr sz="633"/>
+              <a:defRPr sz="578"/>
             </a:lvl4pPr>
-            <a:lvl5pPr marL="1156899" indent="0">
+            <a:lvl5pPr marL="1056132" indent="0">
               <a:buNone/>
-              <a:defRPr sz="633"/>
+              <a:defRPr sz="578"/>
             </a:lvl5pPr>
-            <a:lvl6pPr marL="1446124" indent="0">
+            <a:lvl6pPr marL="1320165" indent="0">
               <a:buNone/>
-              <a:defRPr sz="633"/>
+              <a:defRPr sz="578"/>
             </a:lvl6pPr>
-            <a:lvl7pPr marL="1735348" indent="0">
+            <a:lvl7pPr marL="1584198" indent="0">
               <a:buNone/>
-              <a:defRPr sz="633"/>
+              <a:defRPr sz="578"/>
             </a:lvl7pPr>
-            <a:lvl8pPr marL="2024573" indent="0">
+            <a:lvl8pPr marL="1848231" indent="0">
               <a:buNone/>
-              <a:defRPr sz="633"/>
+              <a:defRPr sz="578"/>
             </a:lvl8pPr>
-            <a:lvl9pPr marL="2313798" indent="0">
+            <a:lvl9pPr marL="2112264" indent="0">
               <a:buNone/>
-              <a:defRPr sz="633"/>
+              <a:defRPr sz="578"/>
             </a:lvl9pPr>
           </a:lstStyle>
           <a:p>
@@ -2053,7 +2053,7 @@
           <a:p>
             <a:fld id="{2DAC84F6-6BCF-0648-8D07-FD4F918A8B04}" type="datetimeFigureOut">
               <a:rPr lang="en-GB" smtClean="0"/>
-              <a:t>29/10/2019</a:t>
+              <a:t>03/11/2019</a:t>
             </a:fld>
             <a:endParaRPr lang="en-GB"/>
           </a:p>
@@ -2138,15 +2138,15 @@
         </p:nvSpPr>
         <p:spPr>
           <a:xfrm>
-            <a:off x="818247" y="289242"/>
-            <a:ext cx="3831371" cy="1012349"/>
+            <a:off x="818247" y="264054"/>
+            <a:ext cx="3831371" cy="924190"/>
           </a:xfrm>
         </p:spPr>
         <p:txBody>
           <a:bodyPr anchor="b"/>
           <a:lstStyle>
             <a:lvl1pPr>
-              <a:defRPr sz="2024"/>
+              <a:defRPr sz="1848"/>
             </a:lvl1pPr>
           </a:lstStyle>
           <a:p>
@@ -2170,8 +2170,8 @@
         </p:nvSpPr>
         <p:spPr>
           <a:xfrm>
-            <a:off x="5050234" y="624684"/>
-            <a:ext cx="6013877" cy="3083245"/>
+            <a:off x="5050234" y="570284"/>
+            <a:ext cx="6013877" cy="2814744"/>
           </a:xfrm>
         </p:spPr>
         <p:txBody>
@@ -2179,39 +2179,39 @@
           <a:lstStyle>
             <a:lvl1pPr marL="0" indent="0">
               <a:buNone/>
-              <a:defRPr sz="2024"/>
+              <a:defRPr sz="1848"/>
             </a:lvl1pPr>
-            <a:lvl2pPr marL="289225" indent="0">
+            <a:lvl2pPr marL="264033" indent="0">
               <a:buNone/>
-              <a:defRPr sz="1771"/>
+              <a:defRPr sz="1617"/>
             </a:lvl2pPr>
-            <a:lvl3pPr marL="578449" indent="0">
+            <a:lvl3pPr marL="528066" indent="0">
               <a:buNone/>
-              <a:defRPr sz="1518"/>
+              <a:defRPr sz="1386"/>
             </a:lvl3pPr>
-            <a:lvl4pPr marL="867674" indent="0">
+            <a:lvl4pPr marL="792099" indent="0">
               <a:buNone/>
-              <a:defRPr sz="1265"/>
+              <a:defRPr sz="1155"/>
             </a:lvl4pPr>
-            <a:lvl5pPr marL="1156899" indent="0">
+            <a:lvl5pPr marL="1056132" indent="0">
               <a:buNone/>
-              <a:defRPr sz="1265"/>
+              <a:defRPr sz="1155"/>
             </a:lvl5pPr>
-            <a:lvl6pPr marL="1446124" indent="0">
+            <a:lvl6pPr marL="1320165" indent="0">
               <a:buNone/>
-              <a:defRPr sz="1265"/>
+              <a:defRPr sz="1155"/>
             </a:lvl6pPr>
-            <a:lvl7pPr marL="1735348" indent="0">
+            <a:lvl7pPr marL="1584198" indent="0">
               <a:buNone/>
-              <a:defRPr sz="1265"/>
+              <a:defRPr sz="1155"/>
             </a:lvl7pPr>
-            <a:lvl8pPr marL="2024573" indent="0">
+            <a:lvl8pPr marL="1848231" indent="0">
               <a:buNone/>
-              <a:defRPr sz="1265"/>
+              <a:defRPr sz="1155"/>
             </a:lvl8pPr>
-            <a:lvl9pPr marL="2313798" indent="0">
+            <a:lvl9pPr marL="2112264" indent="0">
               <a:buNone/>
-              <a:defRPr sz="1265"/>
+              <a:defRPr sz="1155"/>
             </a:lvl9pPr>
           </a:lstStyle>
           <a:p>
@@ -2235,8 +2235,8 @@
         </p:nvSpPr>
         <p:spPr>
           <a:xfrm>
-            <a:off x="818247" y="1301591"/>
-            <a:ext cx="3831371" cy="2411359"/>
+            <a:off x="818247" y="1188244"/>
+            <a:ext cx="3831371" cy="2201369"/>
           </a:xfrm>
         </p:spPr>
         <p:txBody>
@@ -2244,39 +2244,39 @@
           <a:lstStyle>
             <a:lvl1pPr marL="0" indent="0">
               <a:buNone/>
-              <a:defRPr sz="1012"/>
+              <a:defRPr sz="924"/>
             </a:lvl1pPr>
-            <a:lvl2pPr marL="289225" indent="0">
+            <a:lvl2pPr marL="264033" indent="0">
               <a:buNone/>
-              <a:defRPr sz="886"/>
+              <a:defRPr sz="809"/>
             </a:lvl2pPr>
-            <a:lvl3pPr marL="578449" indent="0">
+            <a:lvl3pPr marL="528066" indent="0">
               <a:buNone/>
-              <a:defRPr sz="759"/>
+              <a:defRPr sz="693"/>
             </a:lvl3pPr>
-            <a:lvl4pPr marL="867674" indent="0">
+            <a:lvl4pPr marL="792099" indent="0">
               <a:buNone/>
-              <a:defRPr sz="633"/>
+              <a:defRPr sz="578"/>
             </a:lvl4pPr>
-            <a:lvl5pPr marL="1156899" indent="0">
+            <a:lvl5pPr marL="1056132" indent="0">
               <a:buNone/>
-              <a:defRPr sz="633"/>
+              <a:defRPr sz="578"/>
             </a:lvl5pPr>
-            <a:lvl6pPr marL="1446124" indent="0">
+            <a:lvl6pPr marL="1320165" indent="0">
               <a:buNone/>
-              <a:defRPr sz="633"/>
+              <a:defRPr sz="578"/>
             </a:lvl6pPr>
-            <a:lvl7pPr marL="1735348" indent="0">
+            <a:lvl7pPr marL="1584198" indent="0">
               <a:buNone/>
-              <a:defRPr sz="633"/>
+              <a:defRPr sz="578"/>
             </a:lvl7pPr>
-            <a:lvl8pPr marL="2024573" indent="0">
+            <a:lvl8pPr marL="1848231" indent="0">
               <a:buNone/>
-              <a:defRPr sz="633"/>
+              <a:defRPr sz="578"/>
             </a:lvl8pPr>
-            <a:lvl9pPr marL="2313798" indent="0">
+            <a:lvl9pPr marL="2112264" indent="0">
               <a:buNone/>
-              <a:defRPr sz="633"/>
+              <a:defRPr sz="578"/>
             </a:lvl9pPr>
           </a:lstStyle>
           <a:p>
@@ -2305,7 +2305,7 @@
           <a:p>
             <a:fld id="{2DAC84F6-6BCF-0648-8D07-FD4F918A8B04}" type="datetimeFigureOut">
               <a:rPr lang="en-GB" smtClean="0"/>
-              <a:t>29/10/2019</a:t>
+              <a:t>03/11/2019</a:t>
             </a:fld>
             <a:endParaRPr lang="en-GB"/>
           </a:p>
@@ -2395,8 +2395,8 @@
         </p:nvSpPr>
         <p:spPr>
           <a:xfrm>
-            <a:off x="816700" y="230993"/>
-            <a:ext cx="10245864" cy="838603"/>
+            <a:off x="816700" y="210877"/>
+            <a:ext cx="10245864" cy="765574"/>
           </a:xfrm>
           <a:prstGeom prst="rect">
             <a:avLst/>
@@ -2428,8 +2428,8 @@
         </p:nvSpPr>
         <p:spPr>
           <a:xfrm>
-            <a:off x="816700" y="1154961"/>
-            <a:ext cx="10245864" cy="2752826"/>
+            <a:off x="816700" y="1054383"/>
+            <a:ext cx="10245864" cy="2513099"/>
           </a:xfrm>
           <a:prstGeom prst="rect">
             <a:avLst/>
@@ -2490,8 +2490,8 @@
         </p:nvSpPr>
         <p:spPr>
           <a:xfrm>
-            <a:off x="816699" y="4021275"/>
-            <a:ext cx="2672834" cy="230992"/>
+            <a:off x="816699" y="3671087"/>
+            <a:ext cx="2672834" cy="210877"/>
           </a:xfrm>
           <a:prstGeom prst="rect">
             <a:avLst/>
@@ -2501,7 +2501,7 @@
           <a:bodyPr vert="horz" lIns="91440" tIns="45720" rIns="91440" bIns="45720" rtlCol="0" anchor="ctr"/>
           <a:lstStyle>
             <a:lvl1pPr algn="l">
-              <a:defRPr sz="759">
+              <a:defRPr sz="693">
                 <a:solidFill>
                   <a:schemeClr val="tx1">
                     <a:tint val="75000"/>
@@ -2513,7 +2513,7 @@
           <a:p>
             <a:fld id="{2DAC84F6-6BCF-0648-8D07-FD4F918A8B04}" type="datetimeFigureOut">
               <a:rPr lang="en-GB" smtClean="0"/>
-              <a:t>29/10/2019</a:t>
+              <a:t>03/11/2019</a:t>
             </a:fld>
             <a:endParaRPr lang="en-GB"/>
           </a:p>
@@ -2531,8 +2531,8 @@
         </p:nvSpPr>
         <p:spPr>
           <a:xfrm>
-            <a:off x="3935006" y="4021275"/>
-            <a:ext cx="4009251" cy="230992"/>
+            <a:off x="3935006" y="3671087"/>
+            <a:ext cx="4009251" cy="210877"/>
           </a:xfrm>
           <a:prstGeom prst="rect">
             <a:avLst/>
@@ -2542,7 +2542,7 @@
           <a:bodyPr vert="horz" lIns="91440" tIns="45720" rIns="91440" bIns="45720" rtlCol="0" anchor="ctr"/>
           <a:lstStyle>
             <a:lvl1pPr algn="ctr">
-              <a:defRPr sz="759">
+              <a:defRPr sz="693">
                 <a:solidFill>
                   <a:schemeClr val="tx1">
                     <a:tint val="75000"/>
@@ -2568,8 +2568,8 @@
         </p:nvSpPr>
         <p:spPr>
           <a:xfrm>
-            <a:off x="8389730" y="4021275"/>
-            <a:ext cx="2672834" cy="230992"/>
+            <a:off x="8389730" y="3671087"/>
+            <a:ext cx="2672834" cy="210877"/>
           </a:xfrm>
           <a:prstGeom prst="rect">
             <a:avLst/>
@@ -2579,7 +2579,7 @@
           <a:bodyPr vert="horz" lIns="91440" tIns="45720" rIns="91440" bIns="45720" rtlCol="0" anchor="ctr"/>
           <a:lstStyle>
             <a:lvl1pPr algn="r">
-              <a:defRPr sz="759">
+              <a:defRPr sz="693">
                 <a:solidFill>
                   <a:schemeClr val="tx1">
                     <a:tint val="75000"/>
@@ -2600,27 +2600,27 @@
     </p:spTree>
     <p:extLst>
       <p:ext uri="{BB962C8B-B14F-4D97-AF65-F5344CB8AC3E}">
-        <p14:creationId xmlns:p14="http://schemas.microsoft.com/office/powerpoint/2010/main" val="635160110"/>
+        <p14:creationId xmlns:p14="http://schemas.microsoft.com/office/powerpoint/2010/main" val="428646694"/>
       </p:ext>
     </p:extLst>
   </p:cSld>
   <p:clrMap bg1="lt1" tx1="dk1" bg2="lt2" tx2="dk2" accent1="accent1" accent2="accent2" accent3="accent3" accent4="accent4" accent5="accent5" accent6="accent6" hlink="hlink" folHlink="folHlink"/>
   <p:sldLayoutIdLst>
-    <p:sldLayoutId id="2147483685" r:id="rId1"/>
-    <p:sldLayoutId id="2147483686" r:id="rId2"/>
-    <p:sldLayoutId id="2147483687" r:id="rId3"/>
-    <p:sldLayoutId id="2147483688" r:id="rId4"/>
-    <p:sldLayoutId id="2147483689" r:id="rId5"/>
-    <p:sldLayoutId id="2147483690" r:id="rId6"/>
-    <p:sldLayoutId id="2147483691" r:id="rId7"/>
-    <p:sldLayoutId id="2147483692" r:id="rId8"/>
-    <p:sldLayoutId id="2147483693" r:id="rId9"/>
-    <p:sldLayoutId id="2147483694" r:id="rId10"/>
-    <p:sldLayoutId id="2147483695" r:id="rId11"/>
+    <p:sldLayoutId id="2147483709" r:id="rId1"/>
+    <p:sldLayoutId id="2147483710" r:id="rId2"/>
+    <p:sldLayoutId id="2147483711" r:id="rId3"/>
+    <p:sldLayoutId id="2147483712" r:id="rId4"/>
+    <p:sldLayoutId id="2147483713" r:id="rId5"/>
+    <p:sldLayoutId id="2147483714" r:id="rId6"/>
+    <p:sldLayoutId id="2147483715" r:id="rId7"/>
+    <p:sldLayoutId id="2147483716" r:id="rId8"/>
+    <p:sldLayoutId id="2147483717" r:id="rId9"/>
+    <p:sldLayoutId id="2147483718" r:id="rId10"/>
+    <p:sldLayoutId id="2147483719" r:id="rId11"/>
   </p:sldLayoutIdLst>
   <p:txStyles>
     <p:titleStyle>
-      <a:lvl1pPr algn="l" defTabSz="578449" rtl="0" eaLnBrk="1" latinLnBrk="0" hangingPunct="1">
+      <a:lvl1pPr algn="l" defTabSz="528066" rtl="0" eaLnBrk="1" latinLnBrk="0" hangingPunct="1">
         <a:lnSpc>
           <a:spcPct val="90000"/>
         </a:lnSpc>
@@ -2628,7 +2628,7 @@
           <a:spcPct val="0"/>
         </a:spcBef>
         <a:buNone/>
-        <a:defRPr sz="2783" kern="1200">
+        <a:defRPr sz="2541" kern="1200">
           <a:solidFill>
             <a:schemeClr val="tx1"/>
           </a:solidFill>
@@ -2639,16 +2639,16 @@
       </a:lvl1pPr>
     </p:titleStyle>
     <p:bodyStyle>
-      <a:lvl1pPr marL="144612" indent="-144612" algn="l" defTabSz="578449" rtl="0" eaLnBrk="1" latinLnBrk="0" hangingPunct="1">
+      <a:lvl1pPr marL="132017" indent="-132017" algn="l" defTabSz="528066" rtl="0" eaLnBrk="1" latinLnBrk="0" hangingPunct="1">
         <a:lnSpc>
           <a:spcPct val="90000"/>
         </a:lnSpc>
         <a:spcBef>
-          <a:spcPts val="633"/>
+          <a:spcPts val="578"/>
         </a:spcBef>
         <a:buFont typeface="Arial" panose="020B0604020202020204" pitchFamily="34" charset="0"/>
         <a:buChar char="•"/>
-        <a:defRPr sz="1771" kern="1200">
+        <a:defRPr sz="1617" kern="1200">
           <a:solidFill>
             <a:schemeClr val="tx1"/>
           </a:solidFill>
@@ -2657,16 +2657,16 @@
           <a:cs typeface="+mn-cs"/>
         </a:defRPr>
       </a:lvl1pPr>
-      <a:lvl2pPr marL="433837" indent="-144612" algn="l" defTabSz="578449" rtl="0" eaLnBrk="1" latinLnBrk="0" hangingPunct="1">
+      <a:lvl2pPr marL="396050" indent="-132017" algn="l" defTabSz="528066" rtl="0" eaLnBrk="1" latinLnBrk="0" hangingPunct="1">
         <a:lnSpc>
           <a:spcPct val="90000"/>
         </a:lnSpc>
         <a:spcBef>
-          <a:spcPts val="316"/>
+          <a:spcPts val="289"/>
         </a:spcBef>
         <a:buFont typeface="Arial" panose="020B0604020202020204" pitchFamily="34" charset="0"/>
         <a:buChar char="•"/>
-        <a:defRPr sz="1518" kern="1200">
+        <a:defRPr sz="1386" kern="1200">
           <a:solidFill>
             <a:schemeClr val="tx1"/>
           </a:solidFill>
@@ -2675,16 +2675,16 @@
           <a:cs typeface="+mn-cs"/>
         </a:defRPr>
       </a:lvl2pPr>
-      <a:lvl3pPr marL="723062" indent="-144612" algn="l" defTabSz="578449" rtl="0" eaLnBrk="1" latinLnBrk="0" hangingPunct="1">
+      <a:lvl3pPr marL="660083" indent="-132017" algn="l" defTabSz="528066" rtl="0" eaLnBrk="1" latinLnBrk="0" hangingPunct="1">
         <a:lnSpc>
           <a:spcPct val="90000"/>
         </a:lnSpc>
         <a:spcBef>
-          <a:spcPts val="316"/>
+          <a:spcPts val="289"/>
         </a:spcBef>
         <a:buFont typeface="Arial" panose="020B0604020202020204" pitchFamily="34" charset="0"/>
         <a:buChar char="•"/>
-        <a:defRPr sz="1265" kern="1200">
+        <a:defRPr sz="1155" kern="1200">
           <a:solidFill>
             <a:schemeClr val="tx1"/>
           </a:solidFill>
@@ -2693,16 +2693,16 @@
           <a:cs typeface="+mn-cs"/>
         </a:defRPr>
       </a:lvl3pPr>
-      <a:lvl4pPr marL="1012287" indent="-144612" algn="l" defTabSz="578449" rtl="0" eaLnBrk="1" latinLnBrk="0" hangingPunct="1">
+      <a:lvl4pPr marL="924116" indent="-132017" algn="l" defTabSz="528066" rtl="0" eaLnBrk="1" latinLnBrk="0" hangingPunct="1">
         <a:lnSpc>
           <a:spcPct val="90000"/>
         </a:lnSpc>
         <a:spcBef>
-          <a:spcPts val="316"/>
+          <a:spcPts val="289"/>
         </a:spcBef>
         <a:buFont typeface="Arial" panose="020B0604020202020204" pitchFamily="34" charset="0"/>
         <a:buChar char="•"/>
-        <a:defRPr sz="1139" kern="1200">
+        <a:defRPr sz="1040" kern="1200">
           <a:solidFill>
             <a:schemeClr val="tx1"/>
           </a:solidFill>
@@ -2711,16 +2711,16 @@
           <a:cs typeface="+mn-cs"/>
         </a:defRPr>
       </a:lvl4pPr>
-      <a:lvl5pPr marL="1301511" indent="-144612" algn="l" defTabSz="578449" rtl="0" eaLnBrk="1" latinLnBrk="0" hangingPunct="1">
+      <a:lvl5pPr marL="1188149" indent="-132017" algn="l" defTabSz="528066" rtl="0" eaLnBrk="1" latinLnBrk="0" hangingPunct="1">
         <a:lnSpc>
           <a:spcPct val="90000"/>
         </a:lnSpc>
         <a:spcBef>
-          <a:spcPts val="316"/>
+          <a:spcPts val="289"/>
         </a:spcBef>
         <a:buFont typeface="Arial" panose="020B0604020202020204" pitchFamily="34" charset="0"/>
         <a:buChar char="•"/>
-        <a:defRPr sz="1139" kern="1200">
+        <a:defRPr sz="1040" kern="1200">
           <a:solidFill>
             <a:schemeClr val="tx1"/>
           </a:solidFill>
@@ -2729,16 +2729,16 @@
           <a:cs typeface="+mn-cs"/>
         </a:defRPr>
       </a:lvl5pPr>
-      <a:lvl6pPr marL="1590736" indent="-144612" algn="l" defTabSz="578449" rtl="0" eaLnBrk="1" latinLnBrk="0" hangingPunct="1">
+      <a:lvl6pPr marL="1452182" indent="-132017" algn="l" defTabSz="528066" rtl="0" eaLnBrk="1" latinLnBrk="0" hangingPunct="1">
         <a:lnSpc>
           <a:spcPct val="90000"/>
         </a:lnSpc>
         <a:spcBef>
-          <a:spcPts val="316"/>
+          <a:spcPts val="289"/>
         </a:spcBef>
         <a:buFont typeface="Arial" panose="020B0604020202020204" pitchFamily="34" charset="0"/>
         <a:buChar char="•"/>
-        <a:defRPr sz="1139" kern="1200">
+        <a:defRPr sz="1040" kern="1200">
           <a:solidFill>
             <a:schemeClr val="tx1"/>
           </a:solidFill>
@@ -2747,16 +2747,16 @@
           <a:cs typeface="+mn-cs"/>
         </a:defRPr>
       </a:lvl6pPr>
-      <a:lvl7pPr marL="1879961" indent="-144612" algn="l" defTabSz="578449" rtl="0" eaLnBrk="1" latinLnBrk="0" hangingPunct="1">
+      <a:lvl7pPr marL="1716215" indent="-132017" algn="l" defTabSz="528066" rtl="0" eaLnBrk="1" latinLnBrk="0" hangingPunct="1">
         <a:lnSpc>
           <a:spcPct val="90000"/>
         </a:lnSpc>
         <a:spcBef>
-          <a:spcPts val="316"/>
+          <a:spcPts val="289"/>
         </a:spcBef>
         <a:buFont typeface="Arial" panose="020B0604020202020204" pitchFamily="34" charset="0"/>
         <a:buChar char="•"/>
-        <a:defRPr sz="1139" kern="1200">
+        <a:defRPr sz="1040" kern="1200">
           <a:solidFill>
             <a:schemeClr val="tx1"/>
           </a:solidFill>
@@ -2765,16 +2765,16 @@
           <a:cs typeface="+mn-cs"/>
         </a:defRPr>
       </a:lvl7pPr>
-      <a:lvl8pPr marL="2169185" indent="-144612" algn="l" defTabSz="578449" rtl="0" eaLnBrk="1" latinLnBrk="0" hangingPunct="1">
+      <a:lvl8pPr marL="1980248" indent="-132017" algn="l" defTabSz="528066" rtl="0" eaLnBrk="1" latinLnBrk="0" hangingPunct="1">
         <a:lnSpc>
           <a:spcPct val="90000"/>
         </a:lnSpc>
         <a:spcBef>
-          <a:spcPts val="316"/>
+          <a:spcPts val="289"/>
         </a:spcBef>
         <a:buFont typeface="Arial" panose="020B0604020202020204" pitchFamily="34" charset="0"/>
         <a:buChar char="•"/>
-        <a:defRPr sz="1139" kern="1200">
+        <a:defRPr sz="1040" kern="1200">
           <a:solidFill>
             <a:schemeClr val="tx1"/>
           </a:solidFill>
@@ -2783,16 +2783,16 @@
           <a:cs typeface="+mn-cs"/>
         </a:defRPr>
       </a:lvl8pPr>
-      <a:lvl9pPr marL="2458410" indent="-144612" algn="l" defTabSz="578449" rtl="0" eaLnBrk="1" latinLnBrk="0" hangingPunct="1">
+      <a:lvl9pPr marL="2244281" indent="-132017" algn="l" defTabSz="528066" rtl="0" eaLnBrk="1" latinLnBrk="0" hangingPunct="1">
         <a:lnSpc>
           <a:spcPct val="90000"/>
         </a:lnSpc>
         <a:spcBef>
-          <a:spcPts val="316"/>
+          <a:spcPts val="289"/>
         </a:spcBef>
         <a:buFont typeface="Arial" panose="020B0604020202020204" pitchFamily="34" charset="0"/>
         <a:buChar char="•"/>
-        <a:defRPr sz="1139" kern="1200">
+        <a:defRPr sz="1040" kern="1200">
           <a:solidFill>
             <a:schemeClr val="tx1"/>
           </a:solidFill>
@@ -2806,8 +2806,8 @@
       <a:defPPr>
         <a:defRPr lang="en-US"/>
       </a:defPPr>
-      <a:lvl1pPr marL="0" algn="l" defTabSz="578449" rtl="0" eaLnBrk="1" latinLnBrk="0" hangingPunct="1">
-        <a:defRPr sz="1139" kern="1200">
+      <a:lvl1pPr marL="0" algn="l" defTabSz="528066" rtl="0" eaLnBrk="1" latinLnBrk="0" hangingPunct="1">
+        <a:defRPr sz="1040" kern="1200">
           <a:solidFill>
             <a:schemeClr val="tx1"/>
           </a:solidFill>
@@ -2816,8 +2816,8 @@
           <a:cs typeface="+mn-cs"/>
         </a:defRPr>
       </a:lvl1pPr>
-      <a:lvl2pPr marL="289225" algn="l" defTabSz="578449" rtl="0" eaLnBrk="1" latinLnBrk="0" hangingPunct="1">
-        <a:defRPr sz="1139" kern="1200">
+      <a:lvl2pPr marL="264033" algn="l" defTabSz="528066" rtl="0" eaLnBrk="1" latinLnBrk="0" hangingPunct="1">
+        <a:defRPr sz="1040" kern="1200">
           <a:solidFill>
             <a:schemeClr val="tx1"/>
           </a:solidFill>
@@ -2826,8 +2826,8 @@
           <a:cs typeface="+mn-cs"/>
         </a:defRPr>
       </a:lvl2pPr>
-      <a:lvl3pPr marL="578449" algn="l" defTabSz="578449" rtl="0" eaLnBrk="1" latinLnBrk="0" hangingPunct="1">
-        <a:defRPr sz="1139" kern="1200">
+      <a:lvl3pPr marL="528066" algn="l" defTabSz="528066" rtl="0" eaLnBrk="1" latinLnBrk="0" hangingPunct="1">
+        <a:defRPr sz="1040" kern="1200">
           <a:solidFill>
             <a:schemeClr val="tx1"/>
           </a:solidFill>
@@ -2836,8 +2836,8 @@
           <a:cs typeface="+mn-cs"/>
         </a:defRPr>
       </a:lvl3pPr>
-      <a:lvl4pPr marL="867674" algn="l" defTabSz="578449" rtl="0" eaLnBrk="1" latinLnBrk="0" hangingPunct="1">
-        <a:defRPr sz="1139" kern="1200">
+      <a:lvl4pPr marL="792099" algn="l" defTabSz="528066" rtl="0" eaLnBrk="1" latinLnBrk="0" hangingPunct="1">
+        <a:defRPr sz="1040" kern="1200">
           <a:solidFill>
             <a:schemeClr val="tx1"/>
           </a:solidFill>
@@ -2846,8 +2846,8 @@
           <a:cs typeface="+mn-cs"/>
         </a:defRPr>
       </a:lvl4pPr>
-      <a:lvl5pPr marL="1156899" algn="l" defTabSz="578449" rtl="0" eaLnBrk="1" latinLnBrk="0" hangingPunct="1">
-        <a:defRPr sz="1139" kern="1200">
+      <a:lvl5pPr marL="1056132" algn="l" defTabSz="528066" rtl="0" eaLnBrk="1" latinLnBrk="0" hangingPunct="1">
+        <a:defRPr sz="1040" kern="1200">
           <a:solidFill>
             <a:schemeClr val="tx1"/>
           </a:solidFill>
@@ -2856,8 +2856,8 @@
           <a:cs typeface="+mn-cs"/>
         </a:defRPr>
       </a:lvl5pPr>
-      <a:lvl6pPr marL="1446124" algn="l" defTabSz="578449" rtl="0" eaLnBrk="1" latinLnBrk="0" hangingPunct="1">
-        <a:defRPr sz="1139" kern="1200">
+      <a:lvl6pPr marL="1320165" algn="l" defTabSz="528066" rtl="0" eaLnBrk="1" latinLnBrk="0" hangingPunct="1">
+        <a:defRPr sz="1040" kern="1200">
           <a:solidFill>
             <a:schemeClr val="tx1"/>
           </a:solidFill>
@@ -2866,8 +2866,8 @@
           <a:cs typeface="+mn-cs"/>
         </a:defRPr>
       </a:lvl6pPr>
-      <a:lvl7pPr marL="1735348" algn="l" defTabSz="578449" rtl="0" eaLnBrk="1" latinLnBrk="0" hangingPunct="1">
-        <a:defRPr sz="1139" kern="1200">
+      <a:lvl7pPr marL="1584198" algn="l" defTabSz="528066" rtl="0" eaLnBrk="1" latinLnBrk="0" hangingPunct="1">
+        <a:defRPr sz="1040" kern="1200">
           <a:solidFill>
             <a:schemeClr val="tx1"/>
           </a:solidFill>
@@ -2876,8 +2876,8 @@
           <a:cs typeface="+mn-cs"/>
         </a:defRPr>
       </a:lvl7pPr>
-      <a:lvl8pPr marL="2024573" algn="l" defTabSz="578449" rtl="0" eaLnBrk="1" latinLnBrk="0" hangingPunct="1">
-        <a:defRPr sz="1139" kern="1200">
+      <a:lvl8pPr marL="1848231" algn="l" defTabSz="528066" rtl="0" eaLnBrk="1" latinLnBrk="0" hangingPunct="1">
+        <a:defRPr sz="1040" kern="1200">
           <a:solidFill>
             <a:schemeClr val="tx1"/>
           </a:solidFill>
@@ -2886,8 +2886,8 @@
           <a:cs typeface="+mn-cs"/>
         </a:defRPr>
       </a:lvl8pPr>
-      <a:lvl9pPr marL="2313798" algn="l" defTabSz="578449" rtl="0" eaLnBrk="1" latinLnBrk="0" hangingPunct="1">
-        <a:defRPr sz="1139" kern="1200">
+      <a:lvl9pPr marL="2112264" algn="l" defTabSz="528066" rtl="0" eaLnBrk="1" latinLnBrk="0" hangingPunct="1">
+        <a:defRPr sz="1040" kern="1200">
           <a:solidFill>
             <a:schemeClr val="tx1"/>
           </a:solidFill>
@@ -2926,7 +2926,7 @@
         </p:nvSpPr>
         <p:spPr>
           <a:xfrm rot="17726378">
-            <a:off x="8889103" y="2045245"/>
+            <a:off x="8898728" y="1962210"/>
             <a:ext cx="214762" cy="1601528"/>
           </a:xfrm>
           <a:prstGeom prst="downArrow">
@@ -2982,7 +2982,7 @@
         </p:nvSpPr>
         <p:spPr>
           <a:xfrm rot="14718882">
-            <a:off x="8891177" y="690819"/>
+            <a:off x="8900802" y="607784"/>
             <a:ext cx="214762" cy="1601528"/>
           </a:xfrm>
           <a:prstGeom prst="downArrow">
@@ -3038,7 +3038,7 @@
         </p:nvSpPr>
         <p:spPr>
           <a:xfrm rot="16200000">
-            <a:off x="5403372" y="934898"/>
+            <a:off x="5412997" y="851863"/>
             <a:ext cx="214762" cy="2485192"/>
           </a:xfrm>
           <a:prstGeom prst="downArrow">
@@ -3094,7 +3094,7 @@
         </p:nvSpPr>
         <p:spPr>
           <a:xfrm rot="16200000">
-            <a:off x="2206024" y="934898"/>
+            <a:off x="2215649" y="851863"/>
             <a:ext cx="214762" cy="2485192"/>
           </a:xfrm>
           <a:prstGeom prst="downArrow">
@@ -3150,7 +3150,7 @@
         </p:nvSpPr>
         <p:spPr>
           <a:xfrm>
-            <a:off x="3586112" y="1531682"/>
+            <a:off x="3595737" y="1448649"/>
             <a:ext cx="1848716" cy="1273687"/>
           </a:xfrm>
           <a:prstGeom prst="ellipse">
@@ -3230,7 +3230,7 @@
         </p:nvSpPr>
         <p:spPr>
           <a:xfrm>
-            <a:off x="390260" y="1529407"/>
+            <a:off x="399885" y="1446374"/>
             <a:ext cx="1848716" cy="1273687"/>
           </a:xfrm>
           <a:prstGeom prst="ellipse">
@@ -3310,7 +3310,7 @@
         </p:nvSpPr>
         <p:spPr>
           <a:xfrm>
-            <a:off x="3978659" y="1813582"/>
+            <a:off x="3988284" y="1730547"/>
             <a:ext cx="1059072" cy="704352"/>
           </a:xfrm>
           <a:prstGeom prst="ellipse">
@@ -3384,7 +3384,7 @@
         </p:blipFill>
         <p:spPr>
           <a:xfrm>
-            <a:off x="499442" y="3066457"/>
+            <a:off x="509067" y="2983424"/>
             <a:ext cx="812744" cy="809815"/>
           </a:xfrm>
           <a:prstGeom prst="rect">
@@ -3423,7 +3423,7 @@
         </p:blipFill>
         <p:spPr>
           <a:xfrm>
-            <a:off x="9675313" y="509289"/>
+            <a:off x="9684938" y="426256"/>
             <a:ext cx="812744" cy="809815"/>
           </a:xfrm>
           <a:prstGeom prst="rect">
@@ -3462,7 +3462,7 @@
         </p:blipFill>
         <p:spPr>
           <a:xfrm>
-            <a:off x="3744340" y="3066457"/>
+            <a:off x="3753965" y="2983424"/>
             <a:ext cx="812744" cy="809815"/>
           </a:xfrm>
           <a:prstGeom prst="rect">
@@ -3504,7 +3504,7 @@
         </p:blipFill>
         <p:spPr>
           <a:xfrm>
-            <a:off x="10411069" y="509289"/>
+            <a:off x="10420694" y="426256"/>
             <a:ext cx="812744" cy="809815"/>
           </a:xfrm>
           <a:prstGeom prst="rect">
@@ -3550,7 +3550,7 @@
         </p:blipFill>
         <p:spPr>
           <a:xfrm>
-            <a:off x="9675313" y="3078503"/>
+            <a:off x="9684938" y="2995470"/>
             <a:ext cx="812744" cy="809815"/>
           </a:xfrm>
           <a:prstGeom prst="rect">
@@ -3566,7 +3566,7 @@
         </p:nvSpPr>
         <p:spPr>
           <a:xfrm>
-            <a:off x="1185750" y="2032535"/>
+            <a:off x="1195377" y="1949502"/>
             <a:ext cx="257741" cy="264599"/>
           </a:xfrm>
           <a:prstGeom prst="ellipse">
@@ -3646,7 +3646,7 @@
         </p:blipFill>
         <p:spPr>
           <a:xfrm>
-            <a:off x="4503044" y="3066457"/>
+            <a:off x="4512669" y="2983424"/>
             <a:ext cx="812744" cy="809815"/>
           </a:xfrm>
           <a:prstGeom prst="rect">
@@ -3693,7 +3693,7 @@
         </p:blipFill>
         <p:spPr>
           <a:xfrm>
-            <a:off x="10411069" y="3078503"/>
+            <a:off x="10420694" y="2995470"/>
             <a:ext cx="812744" cy="809815"/>
           </a:xfrm>
           <a:prstGeom prst="rect">
@@ -3716,7 +3716,7 @@
         </p:nvSpPr>
         <p:spPr>
           <a:xfrm>
-            <a:off x="6781964" y="1529407"/>
+            <a:off x="6791589" y="1446374"/>
             <a:ext cx="1848716" cy="1273687"/>
           </a:xfrm>
           <a:prstGeom prst="ellipse">
@@ -3796,7 +3796,7 @@
         </p:nvSpPr>
         <p:spPr>
           <a:xfrm>
-            <a:off x="2120210" y="2333143"/>
+            <a:off x="2129837" y="2250110"/>
             <a:ext cx="1584675" cy="492443"/>
           </a:xfrm>
           <a:prstGeom prst="rect">
@@ -3829,7 +3829,7 @@
         </p:nvSpPr>
         <p:spPr>
           <a:xfrm>
-            <a:off x="3605064" y="959723"/>
+            <a:off x="3614691" y="876690"/>
             <a:ext cx="2068557" cy="307777"/>
           </a:xfrm>
           <a:prstGeom prst="rect">
@@ -3862,7 +3862,7 @@
         </p:nvSpPr>
         <p:spPr>
           <a:xfrm>
-            <a:off x="2695385" y="1806537"/>
+            <a:off x="2705012" y="1723504"/>
             <a:ext cx="1240037" cy="307777"/>
           </a:xfrm>
           <a:prstGeom prst="rect">
@@ -3895,7 +3895,7 @@
         </p:nvSpPr>
         <p:spPr>
           <a:xfrm rot="16200000">
-            <a:off x="4380970" y="-3584107"/>
+            <a:off x="4390595" y="-3667142"/>
             <a:ext cx="260246" cy="8241667"/>
           </a:xfrm>
           <a:custGeom>
@@ -5314,7 +5314,7 @@
         </p:nvSpPr>
         <p:spPr>
           <a:xfrm rot="3600000">
-            <a:off x="4706913" y="1916358"/>
+            <a:off x="4716540" y="1833325"/>
             <a:ext cx="45719" cy="258649"/>
           </a:xfrm>
           <a:custGeom>
@@ -5440,7 +5440,7 @@
         </p:nvSpPr>
         <p:spPr>
           <a:xfrm rot="3779841">
-            <a:off x="4808361" y="1938932"/>
+            <a:off x="4817988" y="1855897"/>
             <a:ext cx="64343" cy="55096"/>
           </a:xfrm>
           <a:prstGeom prst="flowChartExtract">
@@ -5491,7 +5491,7 @@
         </p:nvSpPr>
         <p:spPr>
           <a:xfrm rot="16200000">
-            <a:off x="4206533" y="2018487"/>
+            <a:off x="4216158" y="1935452"/>
             <a:ext cx="58166" cy="314166"/>
           </a:xfrm>
           <a:custGeom>
@@ -5617,7 +5617,7 @@
         </p:nvSpPr>
         <p:spPr>
           <a:xfrm rot="3779841">
-            <a:off x="4049822" y="2148022"/>
+            <a:off x="4059449" y="2064987"/>
             <a:ext cx="64343" cy="55096"/>
           </a:xfrm>
           <a:prstGeom prst="flowChartExtract">
@@ -5668,7 +5668,7 @@
         </p:nvSpPr>
         <p:spPr>
           <a:xfrm rot="18000000">
-            <a:off x="4692039" y="2161902"/>
+            <a:off x="4701666" y="2078869"/>
             <a:ext cx="49627" cy="256973"/>
           </a:xfrm>
           <a:custGeom>
@@ -5794,7 +5794,7 @@
         </p:nvSpPr>
         <p:spPr>
           <a:xfrm rot="5579841">
-            <a:off x="4809837" y="2321885"/>
+            <a:off x="4819464" y="2238850"/>
             <a:ext cx="64343" cy="55096"/>
           </a:xfrm>
           <a:prstGeom prst="flowChartExtract">
@@ -5845,7 +5845,7 @@
         </p:nvSpPr>
         <p:spPr>
           <a:xfrm rot="11700000">
-            <a:off x="4390994" y="2252769"/>
+            <a:off x="4400619" y="2169736"/>
             <a:ext cx="60454" cy="206375"/>
           </a:xfrm>
           <a:custGeom>
@@ -5971,7 +5971,7 @@
         </p:nvSpPr>
         <p:spPr>
           <a:xfrm rot="12779841">
-            <a:off x="4359834" y="2447627"/>
+            <a:off x="4369461" y="2364592"/>
             <a:ext cx="64343" cy="55096"/>
           </a:xfrm>
           <a:prstGeom prst="flowChartExtract">
@@ -6022,7 +6022,7 @@
         </p:nvSpPr>
         <p:spPr>
           <a:xfrm rot="20700000">
-            <a:off x="4420328" y="1876904"/>
+            <a:off x="4429953" y="1793871"/>
             <a:ext cx="60454" cy="206375"/>
           </a:xfrm>
           <a:custGeom>
@@ -6148,7 +6148,7 @@
         </p:nvSpPr>
         <p:spPr>
           <a:xfrm rot="179841">
-            <a:off x="4371219" y="1843188"/>
+            <a:off x="4380846" y="1760153"/>
             <a:ext cx="64343" cy="55096"/>
           </a:xfrm>
           <a:prstGeom prst="flowChartExtract">
@@ -6199,7 +6199,7 @@
         </p:nvSpPr>
         <p:spPr>
           <a:xfrm>
-            <a:off x="4381602" y="2034810"/>
+            <a:off x="4391229" y="1951777"/>
             <a:ext cx="257741" cy="264599"/>
           </a:xfrm>
           <a:prstGeom prst="ellipse">
@@ -6250,7 +6250,7 @@
         </p:nvSpPr>
         <p:spPr>
           <a:xfrm>
-            <a:off x="6907794" y="1641645"/>
+            <a:off x="6917419" y="1558612"/>
             <a:ext cx="1590528" cy="1046375"/>
           </a:xfrm>
           <a:prstGeom prst="ellipse">
@@ -6301,7 +6301,7 @@
         </p:nvSpPr>
         <p:spPr>
           <a:xfrm rot="3600000">
-            <a:off x="7934968" y="1738414"/>
+            <a:off x="7944595" y="1655381"/>
             <a:ext cx="90811" cy="448769"/>
           </a:xfrm>
           <a:custGeom>
@@ -6427,7 +6427,7 @@
         </p:nvSpPr>
         <p:spPr>
           <a:xfrm rot="3779841">
-            <a:off x="8139554" y="1781102"/>
+            <a:off x="8149181" y="1698069"/>
             <a:ext cx="90085" cy="82743"/>
           </a:xfrm>
           <a:prstGeom prst="flowChartExtract">
@@ -6478,7 +6478,7 @@
         </p:nvSpPr>
         <p:spPr>
           <a:xfrm rot="16200000">
-            <a:off x="7288401" y="1791107"/>
+            <a:off x="7298028" y="1708072"/>
             <a:ext cx="100471" cy="650500"/>
           </a:xfrm>
           <a:custGeom>
@@ -6604,7 +6604,7 @@
         </p:nvSpPr>
         <p:spPr>
           <a:xfrm rot="3779841">
-            <a:off x="6968221" y="2064545"/>
+            <a:off x="6977848" y="1981512"/>
             <a:ext cx="90085" cy="82743"/>
           </a:xfrm>
           <a:prstGeom prst="flowChartExtract">
@@ -6655,7 +6655,7 @@
         </p:nvSpPr>
         <p:spPr>
           <a:xfrm rot="18000000">
-            <a:off x="7956049" y="2120942"/>
+            <a:off x="7965676" y="2037909"/>
             <a:ext cx="60469" cy="452637"/>
           </a:xfrm>
           <a:custGeom>
@@ -6781,7 +6781,7 @@
         </p:nvSpPr>
         <p:spPr>
           <a:xfrm rot="5579841">
-            <a:off x="8153196" y="2408477"/>
+            <a:off x="8162823" y="2325442"/>
             <a:ext cx="90085" cy="82744"/>
           </a:xfrm>
           <a:prstGeom prst="flowChartExtract">
@@ -6832,7 +6832,7 @@
         </p:nvSpPr>
         <p:spPr>
           <a:xfrm rot="12423650">
-            <a:off x="7534889" y="2237057"/>
+            <a:off x="7544514" y="2154024"/>
             <a:ext cx="90790" cy="362021"/>
           </a:xfrm>
           <a:custGeom>
@@ -6958,7 +6958,7 @@
         </p:nvSpPr>
         <p:spPr>
           <a:xfrm rot="12779841">
-            <a:off x="7443265" y="2566940"/>
+            <a:off x="7452890" y="2483905"/>
             <a:ext cx="96632" cy="77138"/>
           </a:xfrm>
           <a:prstGeom prst="flowChartExtract">
@@ -7009,7 +7009,7 @@
         </p:nvSpPr>
         <p:spPr>
           <a:xfrm rot="20700000">
-            <a:off x="7588954" y="1760792"/>
+            <a:off x="7598579" y="1677757"/>
             <a:ext cx="90790" cy="288940"/>
           </a:xfrm>
           <a:custGeom>
@@ -7135,7 +7135,7 @@
         </p:nvSpPr>
         <p:spPr>
           <a:xfrm rot="179841">
-            <a:off x="7535766" y="1704540"/>
+            <a:off x="7545391" y="1621505"/>
             <a:ext cx="96632" cy="77138"/>
           </a:xfrm>
           <a:prstGeom prst="flowChartExtract">
@@ -7186,7 +7186,7 @@
         </p:nvSpPr>
         <p:spPr>
           <a:xfrm>
-            <a:off x="7573001" y="2026796"/>
+            <a:off x="7582628" y="1943763"/>
             <a:ext cx="257741" cy="264599"/>
           </a:xfrm>
           <a:prstGeom prst="ellipse">
@@ -7237,7 +7237,7 @@
         </p:nvCxnSpPr>
         <p:spPr>
           <a:xfrm flipH="1">
-            <a:off x="851086" y="3105807"/>
+            <a:off x="860711" y="3022772"/>
             <a:ext cx="109456" cy="686546"/>
           </a:xfrm>
           <a:prstGeom prst="line">
@@ -7299,7 +7299,7 @@
         </p:blipFill>
         <p:spPr>
           <a:xfrm rot="10800000">
-            <a:off x="1312874" y="3005376"/>
+            <a:off x="1322499" y="2922343"/>
             <a:ext cx="812744" cy="809815"/>
           </a:xfrm>
           <a:prstGeom prst="rect">
@@ -7322,7 +7322,7 @@
         </p:nvCxnSpPr>
         <p:spPr>
           <a:xfrm flipH="1">
-            <a:off x="1630767" y="3105807"/>
+            <a:off x="1640392" y="3022772"/>
             <a:ext cx="109456" cy="686546"/>
           </a:xfrm>
           <a:prstGeom prst="line">
@@ -7358,7 +7358,7 @@
         </p:nvCxnSpPr>
         <p:spPr>
           <a:xfrm flipH="1">
-            <a:off x="4101807" y="3107458"/>
+            <a:off x="4111432" y="3024423"/>
             <a:ext cx="109456" cy="686546"/>
           </a:xfrm>
           <a:prstGeom prst="line">
@@ -7394,7 +7394,7 @@
         </p:nvCxnSpPr>
         <p:spPr>
           <a:xfrm rot="2340000" flipH="1">
-            <a:off x="4850889" y="3107766"/>
+            <a:off x="4860514" y="3024731"/>
             <a:ext cx="109456" cy="686546"/>
           </a:xfrm>
           <a:prstGeom prst="line">
@@ -7453,7 +7453,7 @@
         </p:blipFill>
         <p:spPr>
           <a:xfrm>
-            <a:off x="6931826" y="3079719"/>
+            <a:off x="6941451" y="2996686"/>
             <a:ext cx="812744" cy="809815"/>
           </a:xfrm>
           <a:prstGeom prst="rect">
@@ -7493,7 +7493,7 @@
         </p:blipFill>
         <p:spPr>
           <a:xfrm>
-            <a:off x="7690530" y="3079719"/>
+            <a:off x="7700155" y="2996686"/>
             <a:ext cx="812744" cy="809815"/>
           </a:xfrm>
           <a:prstGeom prst="rect">
@@ -7516,7 +7516,7 @@
         </p:nvCxnSpPr>
         <p:spPr>
           <a:xfrm flipH="1">
-            <a:off x="7289293" y="3120720"/>
+            <a:off x="7298918" y="3037685"/>
             <a:ext cx="109456" cy="686546"/>
           </a:xfrm>
           <a:prstGeom prst="line">
@@ -7552,7 +7552,7 @@
         </p:nvCxnSpPr>
         <p:spPr>
           <a:xfrm rot="2340000" flipH="1">
-            <a:off x="8038375" y="3121028"/>
+            <a:off x="8048000" y="3037993"/>
             <a:ext cx="109456" cy="686546"/>
           </a:xfrm>
           <a:prstGeom prst="line">
@@ -7588,7 +7588,7 @@
         </p:nvSpPr>
         <p:spPr>
           <a:xfrm>
-            <a:off x="1673974" y="797385"/>
+            <a:off x="1683599" y="714350"/>
             <a:ext cx="1120762" cy="523220"/>
           </a:xfrm>
           <a:prstGeom prst="rect">
@@ -7621,7 +7621,7 @@
         </p:nvSpPr>
         <p:spPr>
           <a:xfrm rot="1367624">
-            <a:off x="2013399" y="1267834"/>
+            <a:off x="2023024" y="1184799"/>
             <a:ext cx="136436" cy="463832"/>
           </a:xfrm>
           <a:prstGeom prst="downArrow">
@@ -7677,7 +7677,7 @@
         </p:nvSpPr>
         <p:spPr>
           <a:xfrm>
-            <a:off x="789430" y="2800262"/>
+            <a:off x="799055" y="2717227"/>
             <a:ext cx="1257362" cy="369332"/>
           </a:xfrm>
           <a:prstGeom prst="rect">
@@ -7739,7 +7739,7 @@
         </p:nvSpPr>
         <p:spPr>
           <a:xfrm>
-            <a:off x="4007046" y="2800262"/>
+            <a:off x="4016671" y="2717227"/>
             <a:ext cx="1257362" cy="369332"/>
           </a:xfrm>
           <a:prstGeom prst="rect">
@@ -7816,7 +7816,7 @@
         </p:nvSpPr>
         <p:spPr>
           <a:xfrm>
-            <a:off x="7160875" y="2813215"/>
+            <a:off x="7170500" y="2730180"/>
             <a:ext cx="1257362" cy="369332"/>
           </a:xfrm>
           <a:prstGeom prst="rect">
@@ -7893,7 +7893,7 @@
         </p:nvSpPr>
         <p:spPr>
           <a:xfrm>
-            <a:off x="4786834" y="1319105"/>
+            <a:off x="4796461" y="1236072"/>
             <a:ext cx="2128015" cy="492443"/>
           </a:xfrm>
           <a:prstGeom prst="rect">
@@ -7926,7 +7926,7 @@
         </p:nvSpPr>
         <p:spPr>
           <a:xfrm rot="2569194">
-            <a:off x="4588925" y="1505945"/>
+            <a:off x="4598550" y="1422910"/>
             <a:ext cx="136436" cy="463832"/>
           </a:xfrm>
           <a:prstGeom prst="downArrow">
@@ -7982,7 +7982,7 @@
         </p:nvSpPr>
         <p:spPr>
           <a:xfrm rot="1507946">
-            <a:off x="8544692" y="2534753"/>
+            <a:off x="8554317" y="2451718"/>
             <a:ext cx="1257362" cy="369332"/>
           </a:xfrm>
           <a:prstGeom prst="rect">
@@ -8059,7 +8059,7 @@
         </p:nvCxnSpPr>
         <p:spPr>
           <a:xfrm flipH="1">
-            <a:off x="10037456" y="3128642"/>
+            <a:off x="10047081" y="3045607"/>
             <a:ext cx="109456" cy="686546"/>
           </a:xfrm>
           <a:prstGeom prst="line">
@@ -8095,7 +8095,7 @@
         </p:nvCxnSpPr>
         <p:spPr>
           <a:xfrm rot="2340000" flipH="1">
-            <a:off x="10762713" y="3121028"/>
+            <a:off x="10772338" y="3037993"/>
             <a:ext cx="109456" cy="686546"/>
           </a:xfrm>
           <a:prstGeom prst="line">
@@ -8131,7 +8131,7 @@
         </p:nvCxnSpPr>
         <p:spPr>
           <a:xfrm flipH="1">
-            <a:off x="10037456" y="569463"/>
+            <a:off x="10047081" y="486428"/>
             <a:ext cx="109456" cy="686546"/>
           </a:xfrm>
           <a:prstGeom prst="line">
@@ -8167,7 +8167,7 @@
         </p:nvCxnSpPr>
         <p:spPr>
           <a:xfrm rot="21300000" flipH="1">
-            <a:off x="10795473" y="572927"/>
+            <a:off x="10805098" y="489892"/>
             <a:ext cx="109456" cy="686546"/>
           </a:xfrm>
           <a:prstGeom prst="line">
@@ -8203,7 +8203,7 @@
         </p:nvSpPr>
         <p:spPr>
           <a:xfrm rot="20066174">
-            <a:off x="8336682" y="1110406"/>
+            <a:off x="8346307" y="1027371"/>
             <a:ext cx="1257362" cy="369332"/>
           </a:xfrm>
           <a:prstGeom prst="rect">
@@ -8280,7 +8280,7 @@
         </p:nvSpPr>
         <p:spPr>
           <a:xfrm>
-            <a:off x="9765732" y="61833"/>
+            <a:off x="9775357" y="-21202"/>
             <a:ext cx="1998122" cy="523220"/>
           </a:xfrm>
           <a:prstGeom prst="rect">
@@ -8323,7 +8323,7 @@
         </p:nvSpPr>
         <p:spPr>
           <a:xfrm>
-            <a:off x="9735785" y="2088610"/>
+            <a:off x="9774288" y="1967076"/>
             <a:ext cx="2192615" cy="1015663"/>
           </a:xfrm>
           <a:prstGeom prst="rect">
@@ -8356,7 +8356,7 @@
         </p:nvSpPr>
         <p:spPr>
           <a:xfrm>
-            <a:off x="640215" y="3753723"/>
+            <a:off x="649842" y="3670690"/>
             <a:ext cx="1240037" cy="276999"/>
           </a:xfrm>
           <a:prstGeom prst="rect">
@@ -8371,7 +8371,7 @@
           <a:lstStyle/>
           <a:p>
             <a:r>
-              <a:rPr lang="en-GB" sz="1200" smtClean="0">
+              <a:rPr lang="en-GB" sz="1200">
                 <a:latin typeface="Gill Sans" charset="0"/>
                 <a:ea typeface="Gill Sans" charset="0"/>
                 <a:cs typeface="Gill Sans" charset="0"/>
@@ -8394,7 +8394,7 @@
         </p:nvSpPr>
         <p:spPr>
           <a:xfrm>
-            <a:off x="1459395" y="3751460"/>
+            <a:off x="1469022" y="3668427"/>
             <a:ext cx="638473" cy="276999"/>
           </a:xfrm>
           <a:prstGeom prst="rect">
@@ -8409,7 +8409,7 @@
           <a:lstStyle/>
           <a:p>
             <a:r>
-              <a:rPr lang="en-GB" sz="1200" smtClean="0">
+              <a:rPr lang="en-GB" sz="1200">
                 <a:latin typeface="Gill Sans" charset="0"/>
                 <a:ea typeface="Gill Sans" charset="0"/>
                 <a:cs typeface="Gill Sans" charset="0"/>
@@ -8432,7 +8432,7 @@
         </p:nvSpPr>
         <p:spPr>
           <a:xfrm>
-            <a:off x="3873302" y="3751460"/>
+            <a:off x="3882927" y="3668427"/>
             <a:ext cx="666780" cy="276999"/>
           </a:xfrm>
           <a:prstGeom prst="rect">
@@ -8447,7 +8447,7 @@
           <a:lstStyle/>
           <a:p>
             <a:r>
-              <a:rPr lang="en-GB" sz="1200" dirty="0" smtClean="0">
+              <a:rPr lang="en-GB" sz="1200" dirty="0">
                 <a:latin typeface="Gill Sans" charset="0"/>
                 <a:ea typeface="Gill Sans" charset="0"/>
                 <a:cs typeface="Gill Sans" charset="0"/>
@@ -8470,7 +8470,7 @@
         </p:nvSpPr>
         <p:spPr>
           <a:xfrm>
-            <a:off x="4694318" y="3751460"/>
+            <a:off x="4703945" y="3668427"/>
             <a:ext cx="638473" cy="276999"/>
           </a:xfrm>
           <a:prstGeom prst="rect">
@@ -8485,7 +8485,7 @@
           <a:lstStyle/>
           <a:p>
             <a:r>
-              <a:rPr lang="en-GB" sz="1200" dirty="0" smtClean="0">
+              <a:rPr lang="en-GB" sz="1200" dirty="0">
                 <a:latin typeface="Gill Sans" charset="0"/>
                 <a:ea typeface="Gill Sans" charset="0"/>
                 <a:cs typeface="Gill Sans" charset="0"/>
@@ -8508,7 +8508,7 @@
         </p:nvSpPr>
         <p:spPr>
           <a:xfrm>
-            <a:off x="7060151" y="3791037"/>
+            <a:off x="7069778" y="3708004"/>
             <a:ext cx="1240037" cy="276999"/>
           </a:xfrm>
           <a:prstGeom prst="rect">
@@ -8523,7 +8523,7 @@
           <a:lstStyle/>
           <a:p>
             <a:r>
-              <a:rPr lang="en-GB" sz="1200" smtClean="0">
+              <a:rPr lang="en-GB" sz="1200">
                 <a:latin typeface="Gill Sans" charset="0"/>
                 <a:ea typeface="Gill Sans" charset="0"/>
                 <a:cs typeface="Gill Sans" charset="0"/>
@@ -8546,7 +8546,7 @@
         </p:nvSpPr>
         <p:spPr>
           <a:xfrm>
-            <a:off x="7879331" y="3788774"/>
+            <a:off x="7888958" y="3705741"/>
             <a:ext cx="638473" cy="276999"/>
           </a:xfrm>
           <a:prstGeom prst="rect">
@@ -8561,7 +8561,7 @@
           <a:lstStyle/>
           <a:p>
             <a:r>
-              <a:rPr lang="en-GB" sz="1200" smtClean="0">
+              <a:rPr lang="en-GB" sz="1200">
                 <a:latin typeface="Gill Sans" charset="0"/>
                 <a:ea typeface="Gill Sans" charset="0"/>
                 <a:cs typeface="Gill Sans" charset="0"/>
@@ -8584,7 +8584,7 @@
         </p:nvSpPr>
         <p:spPr>
           <a:xfrm>
-            <a:off x="9779873" y="3788774"/>
+            <a:off x="9789498" y="3705741"/>
             <a:ext cx="666780" cy="276999"/>
           </a:xfrm>
           <a:prstGeom prst="rect">
@@ -8599,7 +8599,7 @@
           <a:lstStyle/>
           <a:p>
             <a:r>
-              <a:rPr lang="en-GB" sz="1200" dirty="0" smtClean="0">
+              <a:rPr lang="en-GB" sz="1200" dirty="0">
                 <a:latin typeface="Gill Sans" charset="0"/>
                 <a:ea typeface="Gill Sans" charset="0"/>
                 <a:cs typeface="Gill Sans" charset="0"/>
@@ -8622,7 +8622,7 @@
         </p:nvSpPr>
         <p:spPr>
           <a:xfrm>
-            <a:off x="10600889" y="3788774"/>
+            <a:off x="10610516" y="3705741"/>
             <a:ext cx="638473" cy="276999"/>
           </a:xfrm>
           <a:prstGeom prst="rect">
@@ -8637,7 +8637,7 @@
           <a:lstStyle/>
           <a:p>
             <a:r>
-              <a:rPr lang="en-GB" sz="1200" dirty="0" smtClean="0">
+              <a:rPr lang="en-GB" sz="1200" dirty="0">
                 <a:latin typeface="Gill Sans" charset="0"/>
                 <a:ea typeface="Gill Sans" charset="0"/>
                 <a:cs typeface="Gill Sans" charset="0"/>
@@ -8660,7 +8660,7 @@
         </p:nvSpPr>
         <p:spPr>
           <a:xfrm>
-            <a:off x="9796222" y="1228233"/>
+            <a:off x="9805849" y="1145200"/>
             <a:ext cx="1240037" cy="276999"/>
           </a:xfrm>
           <a:prstGeom prst="rect">
@@ -8675,7 +8675,7 @@
           <a:lstStyle/>
           <a:p>
             <a:r>
-              <a:rPr lang="en-GB" sz="1200" smtClean="0">
+              <a:rPr lang="en-GB" sz="1200">
                 <a:latin typeface="Gill Sans" charset="0"/>
                 <a:ea typeface="Gill Sans" charset="0"/>
                 <a:cs typeface="Gill Sans" charset="0"/>
@@ -8698,7 +8698,7 @@
         </p:nvSpPr>
         <p:spPr>
           <a:xfrm>
-            <a:off x="10615402" y="1225970"/>
+            <a:off x="10625029" y="1142937"/>
             <a:ext cx="638473" cy="276999"/>
           </a:xfrm>
           <a:prstGeom prst="rect">
@@ -8713,7 +8713,7 @@
           <a:lstStyle/>
           <a:p>
             <a:r>
-              <a:rPr lang="en-GB" sz="1200" smtClean="0">
+              <a:rPr lang="en-GB" sz="1200">
                 <a:latin typeface="Gill Sans" charset="0"/>
                 <a:ea typeface="Gill Sans" charset="0"/>
                 <a:cs typeface="Gill Sans" charset="0"/>

</xml_diff>